<commit_message>
Cleanup code, add try-with
</commit_message>
<xml_diff>
--- a/Hamming.pptx
+++ b/Hamming.pptx
@@ -5461,7 +5461,7 @@
           <a:p>
             <a:fld id="{841DBA8B-1C55-4E4E-9B74-DA4CFE857DE7}" type="datetimeFigureOut">
               <a:rPr lang="pl-PL" smtClean="0"/>
-              <a:t>21.05.2021</a:t>
+              <a:t>29.05.2021</a:t>
             </a:fld>
             <a:endParaRPr lang="pl-PL"/>
           </a:p>
@@ -6786,7 +6786,7 @@
           <a:p>
             <a:fld id="{841DBA8B-1C55-4E4E-9B74-DA4CFE857DE7}" type="datetimeFigureOut">
               <a:rPr lang="pl-PL" smtClean="0"/>
-              <a:t>21.05.2021</a:t>
+              <a:t>29.05.2021</a:t>
             </a:fld>
             <a:endParaRPr lang="pl-PL"/>
           </a:p>
@@ -12000,8 +12000,8 @@
           </a:p>
         </p:txBody>
       </p:sp>
-      <mc:AlternateContent xmlns:mc="http://schemas.openxmlformats.org/markup-compatibility/2006">
-        <mc:Choice xmlns:a14="http://schemas.microsoft.com/office/drawing/2010/main" Requires="a14">
+      <mc:AlternateContent xmlns:mc="http://schemas.openxmlformats.org/markup-compatibility/2006" xmlns:a14="http://schemas.microsoft.com/office/drawing/2010/main">
+        <mc:Choice Requires="a14">
           <p:sp>
             <p:nvSpPr>
               <p:cNvPr id="4" name="pole tekstowe 3">
@@ -12030,6 +12030,7 @@
               </a:bodyPr>
               <a:lstStyle/>
               <a:p>
+                <a:pPr/>
                 <a14:m>
                   <m:oMathPara xmlns:m="http://schemas.openxmlformats.org/officeDocument/2006/math">
                     <m:oMathParaPr>
@@ -12621,7 +12622,7 @@
             </p:txBody>
           </p:sp>
         </mc:Choice>
-        <mc:Fallback>
+        <mc:Fallback xmlns="">
           <p:sp>
             <p:nvSpPr>
               <p:cNvPr id="4" name="pole tekstowe 3">
@@ -12886,7 +12887,788 @@
           <a:bodyPr/>
           <a:lstStyle/>
           <a:p>
-            <a:endParaRPr lang="pl-PL"/>
+            <a:pPr marL="0" indent="0">
+              <a:buNone/>
+            </a:pPr>
+            <a:r>
+              <a:rPr lang="pl-PL" sz="1800" b="0" dirty="0">
+                <a:solidFill>
+                  <a:srgbClr val="008000"/>
+                </a:solidFill>
+                <a:effectLst/>
+                <a:latin typeface="Consolas" panose="020B0609020204030204" pitchFamily="49" charset="0"/>
+              </a:rPr>
+              <a:t>// data </a:t>
+            </a:r>
+            <a:r>
+              <a:rPr lang="pl-PL" sz="1800" b="0" dirty="0" err="1">
+                <a:solidFill>
+                  <a:srgbClr val="008000"/>
+                </a:solidFill>
+                <a:effectLst/>
+                <a:latin typeface="Consolas" panose="020B0609020204030204" pitchFamily="49" charset="0"/>
+              </a:rPr>
+              <a:t>example</a:t>
+            </a:r>
+            <a:r>
+              <a:rPr lang="pl-PL" sz="1800" b="0" dirty="0">
+                <a:solidFill>
+                  <a:srgbClr val="008000"/>
+                </a:solidFill>
+                <a:effectLst/>
+                <a:latin typeface="Consolas" panose="020B0609020204030204" pitchFamily="49" charset="0"/>
+              </a:rPr>
+              <a:t>: „0110010111010001”</a:t>
+            </a:r>
+            <a:endParaRPr lang="pl-PL" sz="1800" b="0" dirty="0">
+              <a:solidFill>
+                <a:srgbClr val="0000FF"/>
+              </a:solidFill>
+              <a:effectLst/>
+              <a:latin typeface="Consolas" panose="020B0609020204030204" pitchFamily="49" charset="0"/>
+            </a:endParaRPr>
+          </a:p>
+          <a:p>
+            <a:pPr marL="0" indent="0">
+              <a:buNone/>
+            </a:pPr>
+            <a:r>
+              <a:rPr lang="pl-PL" sz="1800" b="0" dirty="0" err="1">
+                <a:solidFill>
+                  <a:srgbClr val="0000FF"/>
+                </a:solidFill>
+                <a:effectLst/>
+                <a:latin typeface="Consolas" panose="020B0609020204030204" pitchFamily="49" charset="0"/>
+              </a:rPr>
+              <a:t>member</a:t>
+            </a:r>
+            <a:r>
+              <a:rPr lang="pl-PL" sz="1800" b="0" dirty="0">
+                <a:solidFill>
+                  <a:srgbClr val="000000"/>
+                </a:solidFill>
+                <a:effectLst/>
+                <a:latin typeface="Consolas" panose="020B0609020204030204" pitchFamily="49" charset="0"/>
+              </a:rPr>
+              <a:t> </a:t>
+            </a:r>
+            <a:r>
+              <a:rPr lang="pl-PL" sz="1800" b="0" dirty="0" err="1">
+                <a:solidFill>
+                  <a:srgbClr val="0000FF"/>
+                </a:solidFill>
+                <a:effectLst/>
+                <a:latin typeface="Consolas" panose="020B0609020204030204" pitchFamily="49" charset="0"/>
+              </a:rPr>
+              <a:t>private</a:t>
+            </a:r>
+            <a:r>
+              <a:rPr lang="pl-PL" sz="1800" b="0" dirty="0">
+                <a:solidFill>
+                  <a:srgbClr val="000000"/>
+                </a:solidFill>
+                <a:effectLst/>
+                <a:latin typeface="Consolas" panose="020B0609020204030204" pitchFamily="49" charset="0"/>
+              </a:rPr>
+              <a:t> </a:t>
+            </a:r>
+            <a:r>
+              <a:rPr lang="pl-PL" sz="1800" b="0" dirty="0" err="1">
+                <a:solidFill>
+                  <a:srgbClr val="001080"/>
+                </a:solidFill>
+                <a:effectLst/>
+                <a:latin typeface="Consolas" panose="020B0609020204030204" pitchFamily="49" charset="0"/>
+              </a:rPr>
+              <a:t>this.</a:t>
+            </a:r>
+            <a:r>
+              <a:rPr lang="pl-PL" sz="1800" b="0" dirty="0" err="1">
+                <a:solidFill>
+                  <a:srgbClr val="795E26"/>
+                </a:solidFill>
+                <a:effectLst/>
+                <a:latin typeface="Consolas" panose="020B0609020204030204" pitchFamily="49" charset="0"/>
+              </a:rPr>
+              <a:t>ComputeXOR</a:t>
+            </a:r>
+            <a:r>
+              <a:rPr lang="pl-PL" sz="1800" b="0" dirty="0">
+                <a:solidFill>
+                  <a:srgbClr val="001080"/>
+                </a:solidFill>
+                <a:effectLst/>
+                <a:latin typeface="Consolas" panose="020B0609020204030204" pitchFamily="49" charset="0"/>
+              </a:rPr>
+              <a:t> </a:t>
+            </a:r>
+            <a:r>
+              <a:rPr lang="pl-PL" sz="1800" b="0" dirty="0">
+                <a:solidFill>
+                  <a:srgbClr val="0000FF"/>
+                </a:solidFill>
+                <a:effectLst/>
+                <a:latin typeface="Consolas" panose="020B0609020204030204" pitchFamily="49" charset="0"/>
+              </a:rPr>
+              <a:t>(</a:t>
+            </a:r>
+            <a:r>
+              <a:rPr lang="pl-PL" sz="1800" b="0" dirty="0">
+                <a:solidFill>
+                  <a:srgbClr val="001080"/>
+                </a:solidFill>
+                <a:effectLst/>
+                <a:latin typeface="Consolas" panose="020B0609020204030204" pitchFamily="49" charset="0"/>
+              </a:rPr>
+              <a:t>data</a:t>
+            </a:r>
+            <a:r>
+              <a:rPr lang="pl-PL" sz="1800" b="0" dirty="0">
+                <a:solidFill>
+                  <a:srgbClr val="0000FF"/>
+                </a:solidFill>
+                <a:effectLst/>
+                <a:latin typeface="Consolas" panose="020B0609020204030204" pitchFamily="49" charset="0"/>
+              </a:rPr>
+              <a:t>:</a:t>
+            </a:r>
+            <a:r>
+              <a:rPr lang="pl-PL" sz="1800" b="0" dirty="0">
+                <a:solidFill>
+                  <a:srgbClr val="000000"/>
+                </a:solidFill>
+                <a:effectLst/>
+                <a:latin typeface="Consolas" panose="020B0609020204030204" pitchFamily="49" charset="0"/>
+              </a:rPr>
+              <a:t> </a:t>
+            </a:r>
+            <a:r>
+              <a:rPr lang="pl-PL" sz="1800" b="0" dirty="0">
+                <a:solidFill>
+                  <a:srgbClr val="267F99"/>
+                </a:solidFill>
+                <a:effectLst/>
+                <a:latin typeface="Consolas" panose="020B0609020204030204" pitchFamily="49" charset="0"/>
+              </a:rPr>
+              <a:t>string</a:t>
+            </a:r>
+            <a:r>
+              <a:rPr lang="pl-PL" sz="1800" b="0" dirty="0">
+                <a:solidFill>
+                  <a:srgbClr val="0000FF"/>
+                </a:solidFill>
+                <a:effectLst/>
+                <a:latin typeface="Consolas" panose="020B0609020204030204" pitchFamily="49" charset="0"/>
+              </a:rPr>
+              <a:t>)</a:t>
+            </a:r>
+            <a:r>
+              <a:rPr lang="pl-PL" sz="1800" b="0" dirty="0">
+                <a:solidFill>
+                  <a:srgbClr val="000000"/>
+                </a:solidFill>
+                <a:effectLst/>
+                <a:latin typeface="Consolas" panose="020B0609020204030204" pitchFamily="49" charset="0"/>
+              </a:rPr>
+              <a:t> </a:t>
+            </a:r>
+            <a:r>
+              <a:rPr lang="pl-PL" sz="1800" b="0" dirty="0">
+                <a:solidFill>
+                  <a:srgbClr val="0000FF"/>
+                </a:solidFill>
+                <a:effectLst/>
+                <a:latin typeface="Consolas" panose="020B0609020204030204" pitchFamily="49" charset="0"/>
+              </a:rPr>
+              <a:t>=</a:t>
+            </a:r>
+            <a:endParaRPr lang="pl-PL" sz="1800" b="0" dirty="0">
+              <a:solidFill>
+                <a:srgbClr val="000000"/>
+              </a:solidFill>
+              <a:effectLst/>
+              <a:latin typeface="Consolas" panose="020B0609020204030204" pitchFamily="49" charset="0"/>
+            </a:endParaRPr>
+          </a:p>
+          <a:p>
+            <a:pPr marL="0" indent="0">
+              <a:buNone/>
+            </a:pPr>
+            <a:r>
+              <a:rPr lang="pl-PL" sz="1800" b="0" dirty="0">
+                <a:solidFill>
+                  <a:srgbClr val="000000"/>
+                </a:solidFill>
+                <a:effectLst/>
+                <a:latin typeface="Consolas" panose="020B0609020204030204" pitchFamily="49" charset="0"/>
+              </a:rPr>
+              <a:t>        </a:t>
+            </a:r>
+            <a:r>
+              <a:rPr lang="pl-PL" sz="1800" b="0" dirty="0">
+                <a:solidFill>
+                  <a:srgbClr val="001080"/>
+                </a:solidFill>
+                <a:effectLst/>
+                <a:latin typeface="Consolas" panose="020B0609020204030204" pitchFamily="49" charset="0"/>
+              </a:rPr>
+              <a:t>data</a:t>
+            </a:r>
+            <a:endParaRPr lang="pl-PL" sz="1800" b="0" dirty="0">
+              <a:solidFill>
+                <a:srgbClr val="000000"/>
+              </a:solidFill>
+              <a:effectLst/>
+              <a:latin typeface="Consolas" panose="020B0609020204030204" pitchFamily="49" charset="0"/>
+            </a:endParaRPr>
+          </a:p>
+          <a:p>
+            <a:pPr marL="0" indent="0">
+              <a:buNone/>
+            </a:pPr>
+            <a:r>
+              <a:rPr lang="pl-PL" sz="1800" b="0" dirty="0">
+                <a:solidFill>
+                  <a:srgbClr val="000000"/>
+                </a:solidFill>
+                <a:effectLst/>
+                <a:latin typeface="Consolas" panose="020B0609020204030204" pitchFamily="49" charset="0"/>
+              </a:rPr>
+              <a:t>        </a:t>
+            </a:r>
+            <a:r>
+              <a:rPr lang="pl-PL" sz="1800" b="0" dirty="0">
+                <a:solidFill>
+                  <a:srgbClr val="0000FF"/>
+                </a:solidFill>
+                <a:effectLst/>
+                <a:latin typeface="Consolas" panose="020B0609020204030204" pitchFamily="49" charset="0"/>
+              </a:rPr>
+              <a:t>|&gt;</a:t>
+            </a:r>
+            <a:r>
+              <a:rPr lang="pl-PL" sz="1800" b="0" dirty="0">
+                <a:solidFill>
+                  <a:srgbClr val="000000"/>
+                </a:solidFill>
+                <a:effectLst/>
+                <a:latin typeface="Consolas" panose="020B0609020204030204" pitchFamily="49" charset="0"/>
+              </a:rPr>
+              <a:t> </a:t>
+            </a:r>
+            <a:r>
+              <a:rPr lang="pl-PL" sz="1800" b="0" dirty="0">
+                <a:solidFill>
+                  <a:srgbClr val="0000FF"/>
+                </a:solidFill>
+                <a:effectLst/>
+                <a:latin typeface="Consolas" panose="020B0609020204030204" pitchFamily="49" charset="0"/>
+              </a:rPr>
+              <a:t>(</a:t>
+            </a:r>
+            <a:r>
+              <a:rPr lang="pl-PL" sz="1800" b="0" dirty="0" err="1">
+                <a:solidFill>
+                  <a:srgbClr val="0000FF"/>
+                </a:solidFill>
+                <a:effectLst/>
+                <a:latin typeface="Consolas" panose="020B0609020204030204" pitchFamily="49" charset="0"/>
+              </a:rPr>
+              <a:t>fun</a:t>
+            </a:r>
+            <a:r>
+              <a:rPr lang="pl-PL" sz="1800" b="0" dirty="0">
+                <a:solidFill>
+                  <a:srgbClr val="001080"/>
+                </a:solidFill>
+                <a:effectLst/>
+                <a:latin typeface="Consolas" panose="020B0609020204030204" pitchFamily="49" charset="0"/>
+              </a:rPr>
+              <a:t> </a:t>
+            </a:r>
+            <a:r>
+              <a:rPr lang="pl-PL" sz="1800" b="0" dirty="0">
+                <a:solidFill>
+                  <a:srgbClr val="0000FF"/>
+                </a:solidFill>
+                <a:effectLst/>
+                <a:latin typeface="Consolas" panose="020B0609020204030204" pitchFamily="49" charset="0"/>
+              </a:rPr>
+              <a:t>(</a:t>
+            </a:r>
+            <a:r>
+              <a:rPr lang="pl-PL" sz="1800" b="0" dirty="0" err="1">
+                <a:solidFill>
+                  <a:srgbClr val="001080"/>
+                </a:solidFill>
+                <a:effectLst/>
+                <a:latin typeface="Consolas" panose="020B0609020204030204" pitchFamily="49" charset="0"/>
+              </a:rPr>
+              <a:t>x</a:t>
+            </a:r>
+            <a:r>
+              <a:rPr lang="pl-PL" sz="1800" b="0" dirty="0" err="1">
+                <a:solidFill>
+                  <a:srgbClr val="0000FF"/>
+                </a:solidFill>
+                <a:effectLst/>
+                <a:latin typeface="Consolas" panose="020B0609020204030204" pitchFamily="49" charset="0"/>
+              </a:rPr>
+              <a:t>:</a:t>
+            </a:r>
+            <a:r>
+              <a:rPr lang="pl-PL" sz="1800" b="0" dirty="0" err="1">
+                <a:solidFill>
+                  <a:srgbClr val="267F99"/>
+                </a:solidFill>
+                <a:effectLst/>
+                <a:latin typeface="Consolas" panose="020B0609020204030204" pitchFamily="49" charset="0"/>
+              </a:rPr>
+              <a:t>string</a:t>
+            </a:r>
+            <a:r>
+              <a:rPr lang="pl-PL" sz="1800" b="0" dirty="0">
+                <a:solidFill>
+                  <a:srgbClr val="0000FF"/>
+                </a:solidFill>
+                <a:effectLst/>
+                <a:latin typeface="Consolas" panose="020B0609020204030204" pitchFamily="49" charset="0"/>
+              </a:rPr>
+              <a:t>)</a:t>
+            </a:r>
+            <a:r>
+              <a:rPr lang="pl-PL" sz="1800" b="0" dirty="0">
+                <a:solidFill>
+                  <a:srgbClr val="000000"/>
+                </a:solidFill>
+                <a:effectLst/>
+                <a:latin typeface="Consolas" panose="020B0609020204030204" pitchFamily="49" charset="0"/>
+              </a:rPr>
+              <a:t> </a:t>
+            </a:r>
+            <a:r>
+              <a:rPr lang="pl-PL" sz="1800" b="0" dirty="0">
+                <a:solidFill>
+                  <a:srgbClr val="0000FF"/>
+                </a:solidFill>
+                <a:effectLst/>
+                <a:latin typeface="Consolas" panose="020B0609020204030204" pitchFamily="49" charset="0"/>
+              </a:rPr>
+              <a:t>-&gt;</a:t>
+            </a:r>
+            <a:r>
+              <a:rPr lang="pl-PL" sz="1800" b="0" dirty="0">
+                <a:solidFill>
+                  <a:srgbClr val="000000"/>
+                </a:solidFill>
+                <a:effectLst/>
+                <a:latin typeface="Consolas" panose="020B0609020204030204" pitchFamily="49" charset="0"/>
+              </a:rPr>
+              <a:t> </a:t>
+            </a:r>
+            <a:r>
+              <a:rPr lang="pl-PL" sz="1800" b="0" dirty="0" err="1">
+                <a:solidFill>
+                  <a:srgbClr val="001080"/>
+                </a:solidFill>
+                <a:effectLst/>
+                <a:latin typeface="Consolas" panose="020B0609020204030204" pitchFamily="49" charset="0"/>
+              </a:rPr>
+              <a:t>x</a:t>
+            </a:r>
+            <a:r>
+              <a:rPr lang="pl-PL" sz="1800" b="0" dirty="0" err="1">
+                <a:solidFill>
+                  <a:srgbClr val="795E26"/>
+                </a:solidFill>
+                <a:effectLst/>
+                <a:latin typeface="Consolas" panose="020B0609020204030204" pitchFamily="49" charset="0"/>
+              </a:rPr>
+              <a:t>.ToCharArray</a:t>
+            </a:r>
+            <a:r>
+              <a:rPr lang="pl-PL" sz="1800" b="0" dirty="0">
+                <a:solidFill>
+                  <a:srgbClr val="0000FF"/>
+                </a:solidFill>
+                <a:effectLst/>
+                <a:latin typeface="Consolas" panose="020B0609020204030204" pitchFamily="49" charset="0"/>
+              </a:rPr>
+              <a:t>())</a:t>
+            </a:r>
+            <a:r>
+              <a:rPr lang="pl-PL" sz="1800" b="0" dirty="0">
+                <a:solidFill>
+                  <a:srgbClr val="000000"/>
+                </a:solidFill>
+                <a:effectLst/>
+                <a:latin typeface="Consolas" panose="020B0609020204030204" pitchFamily="49" charset="0"/>
+              </a:rPr>
+              <a:t> </a:t>
+            </a:r>
+          </a:p>
+          <a:p>
+            <a:pPr marL="0" indent="0">
+              <a:buNone/>
+            </a:pPr>
+            <a:r>
+              <a:rPr lang="pl-PL" sz="1800" b="0" dirty="0">
+                <a:solidFill>
+                  <a:srgbClr val="000000"/>
+                </a:solidFill>
+                <a:effectLst/>
+                <a:latin typeface="Consolas" panose="020B0609020204030204" pitchFamily="49" charset="0"/>
+              </a:rPr>
+              <a:t>        </a:t>
+            </a:r>
+            <a:r>
+              <a:rPr lang="pl-PL" sz="1800" b="0" dirty="0">
+                <a:solidFill>
+                  <a:srgbClr val="0000FF"/>
+                </a:solidFill>
+                <a:effectLst/>
+                <a:latin typeface="Consolas" panose="020B0609020204030204" pitchFamily="49" charset="0"/>
+              </a:rPr>
+              <a:t>|&gt;</a:t>
+            </a:r>
+            <a:r>
+              <a:rPr lang="pl-PL" sz="1800" b="0" dirty="0">
+                <a:solidFill>
+                  <a:srgbClr val="000000"/>
+                </a:solidFill>
+                <a:effectLst/>
+                <a:latin typeface="Consolas" panose="020B0609020204030204" pitchFamily="49" charset="0"/>
+              </a:rPr>
+              <a:t> </a:t>
+            </a:r>
+            <a:r>
+              <a:rPr lang="pl-PL" sz="1800" b="0" dirty="0">
+                <a:solidFill>
+                  <a:srgbClr val="0000FF"/>
+                </a:solidFill>
+                <a:effectLst/>
+                <a:latin typeface="Consolas" panose="020B0609020204030204" pitchFamily="49" charset="0"/>
+              </a:rPr>
+              <a:t>(</a:t>
+            </a:r>
+            <a:r>
+              <a:rPr lang="pl-PL" sz="1800" b="0" dirty="0" err="1">
+                <a:solidFill>
+                  <a:srgbClr val="0000FF"/>
+                </a:solidFill>
+                <a:effectLst/>
+                <a:latin typeface="Consolas" panose="020B0609020204030204" pitchFamily="49" charset="0"/>
+              </a:rPr>
+              <a:t>fun</a:t>
+            </a:r>
+            <a:r>
+              <a:rPr lang="pl-PL" sz="1800" b="0" dirty="0">
+                <a:solidFill>
+                  <a:srgbClr val="001080"/>
+                </a:solidFill>
+                <a:effectLst/>
+                <a:latin typeface="Consolas" panose="020B0609020204030204" pitchFamily="49" charset="0"/>
+              </a:rPr>
+              <a:t> x </a:t>
+            </a:r>
+            <a:r>
+              <a:rPr lang="pl-PL" sz="1800" b="0" dirty="0">
+                <a:solidFill>
+                  <a:srgbClr val="0000FF"/>
+                </a:solidFill>
+                <a:effectLst/>
+                <a:latin typeface="Consolas" panose="020B0609020204030204" pitchFamily="49" charset="0"/>
+              </a:rPr>
+              <a:t>-&gt;</a:t>
+            </a:r>
+            <a:r>
+              <a:rPr lang="pl-PL" sz="1800" b="0" dirty="0">
+                <a:solidFill>
+                  <a:srgbClr val="000000"/>
+                </a:solidFill>
+                <a:effectLst/>
+                <a:latin typeface="Consolas" panose="020B0609020204030204" pitchFamily="49" charset="0"/>
+              </a:rPr>
+              <a:t> </a:t>
+            </a:r>
+            <a:r>
+              <a:rPr lang="pl-PL" sz="1800" b="0" dirty="0" err="1">
+                <a:solidFill>
+                  <a:srgbClr val="222222"/>
+                </a:solidFill>
+                <a:effectLst/>
+                <a:latin typeface="Consolas" panose="020B0609020204030204" pitchFamily="49" charset="0"/>
+              </a:rPr>
+              <a:t>ArrayExtension</a:t>
+            </a:r>
+            <a:r>
+              <a:rPr lang="pl-PL" sz="1800" b="0" dirty="0" err="1">
+                <a:solidFill>
+                  <a:srgbClr val="795E26"/>
+                </a:solidFill>
+                <a:effectLst/>
+                <a:latin typeface="Consolas" panose="020B0609020204030204" pitchFamily="49" charset="0"/>
+              </a:rPr>
+              <a:t>.filter_it</a:t>
+            </a:r>
+            <a:r>
+              <a:rPr lang="pl-PL" sz="1800" b="0" dirty="0">
+                <a:solidFill>
+                  <a:srgbClr val="000000"/>
+                </a:solidFill>
+                <a:effectLst/>
+                <a:latin typeface="Consolas" panose="020B0609020204030204" pitchFamily="49" charset="0"/>
+              </a:rPr>
+              <a:t> </a:t>
+            </a:r>
+            <a:r>
+              <a:rPr lang="pl-PL" sz="1800" b="0" dirty="0">
+                <a:solidFill>
+                  <a:srgbClr val="A31515"/>
+                </a:solidFill>
+                <a:effectLst/>
+                <a:latin typeface="Consolas" panose="020B0609020204030204" pitchFamily="49" charset="0"/>
+              </a:rPr>
+              <a:t>'1'</a:t>
+            </a:r>
+            <a:r>
+              <a:rPr lang="pl-PL" sz="1800" b="0" dirty="0">
+                <a:solidFill>
+                  <a:srgbClr val="000000"/>
+                </a:solidFill>
+                <a:effectLst/>
+                <a:latin typeface="Consolas" panose="020B0609020204030204" pitchFamily="49" charset="0"/>
+              </a:rPr>
+              <a:t> </a:t>
+            </a:r>
+            <a:r>
+              <a:rPr lang="pl-PL" sz="1800" b="0" dirty="0">
+                <a:solidFill>
+                  <a:srgbClr val="001080"/>
+                </a:solidFill>
+                <a:effectLst/>
+                <a:latin typeface="Consolas" panose="020B0609020204030204" pitchFamily="49" charset="0"/>
+              </a:rPr>
+              <a:t>x</a:t>
+            </a:r>
+            <a:r>
+              <a:rPr lang="pl-PL" sz="1800" b="0" dirty="0">
+                <a:solidFill>
+                  <a:srgbClr val="0000FF"/>
+                </a:solidFill>
+                <a:effectLst/>
+                <a:latin typeface="Consolas" panose="020B0609020204030204" pitchFamily="49" charset="0"/>
+              </a:rPr>
+              <a:t>)</a:t>
+            </a:r>
+            <a:endParaRPr lang="pl-PL" sz="1800" b="0" dirty="0">
+              <a:solidFill>
+                <a:srgbClr val="000000"/>
+              </a:solidFill>
+              <a:effectLst/>
+              <a:latin typeface="Consolas" panose="020B0609020204030204" pitchFamily="49" charset="0"/>
+            </a:endParaRPr>
+          </a:p>
+          <a:p>
+            <a:pPr marL="0" indent="0">
+              <a:buNone/>
+            </a:pPr>
+            <a:r>
+              <a:rPr lang="pl-PL" sz="1800" b="0" dirty="0">
+                <a:solidFill>
+                  <a:srgbClr val="000000"/>
+                </a:solidFill>
+                <a:effectLst/>
+                <a:latin typeface="Consolas" panose="020B0609020204030204" pitchFamily="49" charset="0"/>
+              </a:rPr>
+              <a:t>        </a:t>
+            </a:r>
+            <a:r>
+              <a:rPr lang="pl-PL" sz="1800" b="0" dirty="0">
+                <a:solidFill>
+                  <a:srgbClr val="0000FF"/>
+                </a:solidFill>
+                <a:effectLst/>
+                <a:latin typeface="Consolas" panose="020B0609020204030204" pitchFamily="49" charset="0"/>
+              </a:rPr>
+              <a:t>|&gt;</a:t>
+            </a:r>
+            <a:r>
+              <a:rPr lang="pl-PL" sz="1800" b="0" dirty="0">
+                <a:solidFill>
+                  <a:srgbClr val="000000"/>
+                </a:solidFill>
+                <a:effectLst/>
+                <a:latin typeface="Consolas" panose="020B0609020204030204" pitchFamily="49" charset="0"/>
+              </a:rPr>
+              <a:t> </a:t>
+            </a:r>
+            <a:r>
+              <a:rPr lang="pl-PL" sz="1800" b="0" dirty="0" err="1">
+                <a:solidFill>
+                  <a:srgbClr val="222222"/>
+                </a:solidFill>
+                <a:effectLst/>
+                <a:latin typeface="Consolas" panose="020B0609020204030204" pitchFamily="49" charset="0"/>
+              </a:rPr>
+              <a:t>Array</a:t>
+            </a:r>
+            <a:r>
+              <a:rPr lang="pl-PL" sz="1800" b="0" dirty="0" err="1">
+                <a:solidFill>
+                  <a:srgbClr val="795E26"/>
+                </a:solidFill>
+                <a:effectLst/>
+                <a:latin typeface="Consolas" panose="020B0609020204030204" pitchFamily="49" charset="0"/>
+              </a:rPr>
+              <a:t>.fold</a:t>
+            </a:r>
+            <a:r>
+              <a:rPr lang="pl-PL" sz="1800" b="0" dirty="0">
+                <a:solidFill>
+                  <a:srgbClr val="000000"/>
+                </a:solidFill>
+                <a:effectLst/>
+                <a:latin typeface="Consolas" panose="020B0609020204030204" pitchFamily="49" charset="0"/>
+              </a:rPr>
+              <a:t> </a:t>
+            </a:r>
+            <a:r>
+              <a:rPr lang="pl-PL" sz="1800" b="0" dirty="0">
+                <a:solidFill>
+                  <a:srgbClr val="0000FF"/>
+                </a:solidFill>
+                <a:effectLst/>
+                <a:latin typeface="Consolas" panose="020B0609020204030204" pitchFamily="49" charset="0"/>
+              </a:rPr>
+              <a:t>(</a:t>
+            </a:r>
+            <a:r>
+              <a:rPr lang="pl-PL" sz="1800" b="0" dirty="0" err="1">
+                <a:solidFill>
+                  <a:srgbClr val="0000FF"/>
+                </a:solidFill>
+                <a:effectLst/>
+                <a:latin typeface="Consolas" panose="020B0609020204030204" pitchFamily="49" charset="0"/>
+              </a:rPr>
+              <a:t>fun</a:t>
+            </a:r>
+            <a:r>
+              <a:rPr lang="pl-PL" sz="1800" b="0" dirty="0">
+                <a:solidFill>
+                  <a:srgbClr val="001080"/>
+                </a:solidFill>
+                <a:effectLst/>
+                <a:latin typeface="Consolas" panose="020B0609020204030204" pitchFamily="49" charset="0"/>
+              </a:rPr>
+              <a:t> x y </a:t>
+            </a:r>
+            <a:r>
+              <a:rPr lang="pl-PL" sz="1800" b="0" dirty="0">
+                <a:solidFill>
+                  <a:srgbClr val="0000FF"/>
+                </a:solidFill>
+                <a:effectLst/>
+                <a:latin typeface="Consolas" panose="020B0609020204030204" pitchFamily="49" charset="0"/>
+              </a:rPr>
+              <a:t>-&gt;</a:t>
+            </a:r>
+            <a:r>
+              <a:rPr lang="pl-PL" sz="1800" b="0" dirty="0">
+                <a:solidFill>
+                  <a:srgbClr val="000000"/>
+                </a:solidFill>
+                <a:effectLst/>
+                <a:latin typeface="Consolas" panose="020B0609020204030204" pitchFamily="49" charset="0"/>
+              </a:rPr>
+              <a:t> </a:t>
+            </a:r>
+            <a:r>
+              <a:rPr lang="pl-PL" sz="1800" b="0" dirty="0">
+                <a:solidFill>
+                  <a:srgbClr val="001080"/>
+                </a:solidFill>
+                <a:effectLst/>
+                <a:latin typeface="Consolas" panose="020B0609020204030204" pitchFamily="49" charset="0"/>
+              </a:rPr>
+              <a:t>x</a:t>
+            </a:r>
+            <a:r>
+              <a:rPr lang="pl-PL" sz="1800" b="0" dirty="0">
+                <a:solidFill>
+                  <a:srgbClr val="0000FF"/>
+                </a:solidFill>
+                <a:effectLst/>
+                <a:latin typeface="Consolas" panose="020B0609020204030204" pitchFamily="49" charset="0"/>
+              </a:rPr>
+              <a:t>^^^</a:t>
+            </a:r>
+            <a:r>
+              <a:rPr lang="pl-PL" sz="1800" b="0" dirty="0">
+                <a:solidFill>
+                  <a:srgbClr val="001080"/>
+                </a:solidFill>
+                <a:effectLst/>
+                <a:latin typeface="Consolas" panose="020B0609020204030204" pitchFamily="49" charset="0"/>
+              </a:rPr>
+              <a:t>y</a:t>
+            </a:r>
+            <a:r>
+              <a:rPr lang="pl-PL" sz="1800" b="0" dirty="0">
+                <a:solidFill>
+                  <a:srgbClr val="0000FF"/>
+                </a:solidFill>
+                <a:effectLst/>
+                <a:latin typeface="Consolas" panose="020B0609020204030204" pitchFamily="49" charset="0"/>
+              </a:rPr>
+              <a:t>)</a:t>
+            </a:r>
+            <a:r>
+              <a:rPr lang="pl-PL" sz="1800" b="0" dirty="0">
+                <a:solidFill>
+                  <a:srgbClr val="000000"/>
+                </a:solidFill>
+                <a:effectLst/>
+                <a:latin typeface="Consolas" panose="020B0609020204030204" pitchFamily="49" charset="0"/>
+              </a:rPr>
+              <a:t> </a:t>
+            </a:r>
+            <a:r>
+              <a:rPr lang="pl-PL" sz="1800" b="0" dirty="0">
+                <a:solidFill>
+                  <a:srgbClr val="098658"/>
+                </a:solidFill>
+                <a:effectLst/>
+                <a:latin typeface="Consolas" panose="020B0609020204030204" pitchFamily="49" charset="0"/>
+              </a:rPr>
+              <a:t>0</a:t>
+            </a:r>
+            <a:r>
+              <a:rPr lang="pl-PL" sz="1800" b="0" dirty="0">
+                <a:solidFill>
+                  <a:srgbClr val="000000"/>
+                </a:solidFill>
+                <a:effectLst/>
+                <a:latin typeface="Consolas" panose="020B0609020204030204" pitchFamily="49" charset="0"/>
+              </a:rPr>
+              <a:t> </a:t>
+            </a:r>
+            <a:r>
+              <a:rPr lang="pl-PL" b="0" dirty="0">
+                <a:solidFill>
+                  <a:srgbClr val="000000"/>
+                </a:solidFill>
+                <a:effectLst/>
+                <a:latin typeface="Consolas" panose="020B0609020204030204" pitchFamily="49" charset="0"/>
+              </a:rPr>
+              <a:t>    </a:t>
+            </a:r>
+          </a:p>
+          <a:p>
+            <a:pPr marL="0" indent="0">
+              <a:buNone/>
+            </a:pPr>
+            <a:endParaRPr lang="pl-PL" dirty="0"/>
           </a:p>
         </p:txBody>
       </p:sp>

</xml_diff>